<commit_message>
docs : 계발 일정 xlsx 추가
</commit_message>
<xml_diff>
--- a/document/ppt/Hi Snack! 페이지 구성 요소.pptx
+++ b/document/ppt/Hi Snack! 페이지 구성 요소.pptx
@@ -260,7 +260,7 @@
           <a:p>
             <a:fld id="{7E429CB1-A263-4906-B155-09D60AA9D0CE}" type="datetimeFigureOut">
               <a:rPr lang="ko-KR" altLang="en-US" smtClean="0"/>
-              <a:t>2022-03-22</a:t>
+              <a:t>2022-03-29 Tue</a:t>
             </a:fld>
             <a:endParaRPr lang="ko-KR" altLang="en-US"/>
           </a:p>
@@ -513,7 +513,7 @@
           <a:p>
             <a:fld id="{7E429CB1-A263-4906-B155-09D60AA9D0CE}" type="datetimeFigureOut">
               <a:rPr lang="ko-KR" altLang="en-US" smtClean="0"/>
-              <a:t>2022-03-22</a:t>
+              <a:t>2022-03-29 Tue</a:t>
             </a:fld>
             <a:endParaRPr lang="ko-KR" altLang="en-US"/>
           </a:p>
@@ -683,7 +683,7 @@
           <a:p>
             <a:fld id="{7E429CB1-A263-4906-B155-09D60AA9D0CE}" type="datetimeFigureOut">
               <a:rPr lang="ko-KR" altLang="en-US" smtClean="0"/>
-              <a:t>2022-03-22</a:t>
+              <a:t>2022-03-29 Tue</a:t>
             </a:fld>
             <a:endParaRPr lang="ko-KR" altLang="en-US"/>
           </a:p>
@@ -863,7 +863,7 @@
           <a:p>
             <a:fld id="{7E429CB1-A263-4906-B155-09D60AA9D0CE}" type="datetimeFigureOut">
               <a:rPr lang="ko-KR" altLang="en-US" smtClean="0"/>
-              <a:t>2022-03-22</a:t>
+              <a:t>2022-03-29 Tue</a:t>
             </a:fld>
             <a:endParaRPr lang="ko-KR" altLang="en-US"/>
           </a:p>
@@ -1033,7 +1033,7 @@
           <a:p>
             <a:fld id="{7E429CB1-A263-4906-B155-09D60AA9D0CE}" type="datetimeFigureOut">
               <a:rPr lang="ko-KR" altLang="en-US" smtClean="0"/>
-              <a:t>2022-03-22</a:t>
+              <a:t>2022-03-29 Tue</a:t>
             </a:fld>
             <a:endParaRPr lang="ko-KR" altLang="en-US"/>
           </a:p>
@@ -1394,7 +1394,7 @@
           <a:p>
             <a:fld id="{7E429CB1-A263-4906-B155-09D60AA9D0CE}" type="datetimeFigureOut">
               <a:rPr lang="ko-KR" altLang="en-US" smtClean="0"/>
-              <a:t>2022-03-22</a:t>
+              <a:t>2022-03-29 Tue</a:t>
             </a:fld>
             <a:endParaRPr lang="ko-KR" altLang="en-US"/>
           </a:p>
@@ -1626,7 +1626,7 @@
           <a:p>
             <a:fld id="{7E429CB1-A263-4906-B155-09D60AA9D0CE}" type="datetimeFigureOut">
               <a:rPr lang="ko-KR" altLang="en-US" smtClean="0"/>
-              <a:t>2022-03-22</a:t>
+              <a:t>2022-03-29 Tue</a:t>
             </a:fld>
             <a:endParaRPr lang="ko-KR" altLang="en-US"/>
           </a:p>
@@ -1993,7 +1993,7 @@
           <a:p>
             <a:fld id="{7E429CB1-A263-4906-B155-09D60AA9D0CE}" type="datetimeFigureOut">
               <a:rPr lang="ko-KR" altLang="en-US" smtClean="0"/>
-              <a:t>2022-03-22</a:t>
+              <a:t>2022-03-29 Tue</a:t>
             </a:fld>
             <a:endParaRPr lang="ko-KR" altLang="en-US"/>
           </a:p>
@@ -2111,7 +2111,7 @@
           <a:p>
             <a:fld id="{7E429CB1-A263-4906-B155-09D60AA9D0CE}" type="datetimeFigureOut">
               <a:rPr lang="ko-KR" altLang="en-US" smtClean="0"/>
-              <a:t>2022-03-22</a:t>
+              <a:t>2022-03-29 Tue</a:t>
             </a:fld>
             <a:endParaRPr lang="ko-KR" altLang="en-US"/>
           </a:p>
@@ -2206,7 +2206,7 @@
           <a:p>
             <a:fld id="{7E429CB1-A263-4906-B155-09D60AA9D0CE}" type="datetimeFigureOut">
               <a:rPr lang="ko-KR" altLang="en-US" smtClean="0"/>
-              <a:t>2022-03-22</a:t>
+              <a:t>2022-03-29 Tue</a:t>
             </a:fld>
             <a:endParaRPr lang="ko-KR" altLang="en-US"/>
           </a:p>
@@ -2483,7 +2483,7 @@
           <a:p>
             <a:fld id="{7E429CB1-A263-4906-B155-09D60AA9D0CE}" type="datetimeFigureOut">
               <a:rPr lang="ko-KR" altLang="en-US" smtClean="0"/>
-              <a:t>2022-03-22</a:t>
+              <a:t>2022-03-29 Tue</a:t>
             </a:fld>
             <a:endParaRPr lang="ko-KR" altLang="en-US"/>
           </a:p>
@@ -2696,7 +2696,7 @@
           <a:p>
             <a:fld id="{7E429CB1-A263-4906-B155-09D60AA9D0CE}" type="datetimeFigureOut">
               <a:rPr lang="ko-KR" altLang="en-US" smtClean="0"/>
-              <a:t>2022-03-22</a:t>
+              <a:t>2022-03-29 Tue</a:t>
             </a:fld>
             <a:endParaRPr lang="ko-KR" altLang="en-US"/>
           </a:p>
@@ -3829,11 +3829,7 @@
             <a:pPr lvl="1"/>
             <a:r>
               <a:rPr lang="ko-KR" altLang="en-US" smtClean="0"/>
-              <a:t>태그 </a:t>
-            </a:r>
-            <a:r>
-              <a:rPr lang="ko-KR" altLang="en-US" smtClean="0"/>
-              <a:t>내용</a:t>
+              <a:t>태그 내용</a:t>
             </a:r>
             <a:endParaRPr lang="en-US" altLang="ko-KR" smtClean="0"/>
           </a:p>
@@ -5394,11 +5390,7 @@
           <a:p>
             <a:r>
               <a:rPr lang="ko-KR" altLang="en-US" smtClean="0"/>
-              <a:t>구독 </a:t>
-            </a:r>
-            <a:r>
-              <a:rPr lang="ko-KR" altLang="en-US" smtClean="0"/>
-              <a:t>설명</a:t>
+              <a:t>구독 설명</a:t>
             </a:r>
             <a:endParaRPr lang="en-US" altLang="ko-KR" smtClean="0"/>
           </a:p>
@@ -5451,11 +5443,7 @@
             </a:r>
             <a:r>
               <a:rPr lang="ko-KR" altLang="en-US" smtClean="0"/>
-              <a:t>금액 </a:t>
-            </a:r>
-            <a:r>
-              <a:rPr lang="ko-KR" altLang="en-US" smtClean="0"/>
-              <a:t>설정</a:t>
+              <a:t>금액 설정</a:t>
             </a:r>
             <a:endParaRPr lang="en-US" altLang="ko-KR" smtClean="0"/>
           </a:p>
@@ -5479,11 +5467,7 @@
             </a:r>
             <a:r>
               <a:rPr lang="ko-KR" altLang="en-US" smtClean="0"/>
-              <a:t>어떤 이름</a:t>
-            </a:r>
-            <a:r>
-              <a:rPr lang="ko-KR" altLang="en-US" smtClean="0"/>
-              <a:t>인가요</a:t>
+              <a:t>어떤 이름인가요</a:t>
             </a:r>
             <a:r>
               <a:rPr lang="en-US" altLang="ko-KR" smtClean="0"/>
@@ -5617,11 +5601,7 @@
             <a:pPr algn="ctr"/>
             <a:r>
               <a:rPr lang="ko-KR" altLang="en-US" smtClean="0"/>
-              <a:t>구독 </a:t>
-            </a:r>
-            <a:r>
-              <a:rPr lang="ko-KR" altLang="en-US" smtClean="0"/>
-              <a:t>이름</a:t>
+              <a:t>구독 이름</a:t>
             </a:r>
             <a:r>
               <a:rPr lang="en-US" altLang="ko-KR" smtClean="0"/>
@@ -6262,11 +6242,7 @@
             <a:pPr algn="ctr"/>
             <a:r>
               <a:rPr lang="ko-KR" altLang="en-US" smtClean="0"/>
-              <a:t>상품 </a:t>
-            </a:r>
-            <a:r>
-              <a:rPr lang="ko-KR" altLang="en-US" smtClean="0"/>
-              <a:t>목록</a:t>
+              <a:t>상품 목록</a:t>
             </a:r>
             <a:endParaRPr lang="ko-KR" altLang="en-US"/>
           </a:p>
@@ -6687,11 +6663,7 @@
             <a:pPr lvl="1"/>
             <a:r>
               <a:rPr lang="ko-KR" altLang="en-US" smtClean="0"/>
-              <a:t>결제 </a:t>
-            </a:r>
-            <a:r>
-              <a:rPr lang="ko-KR" altLang="en-US" smtClean="0"/>
-              <a:t>확인 체크박스</a:t>
+              <a:t>결제 확인 체크박스</a:t>
             </a:r>
             <a:endParaRPr lang="en-US" altLang="ko-KR" dirty="0"/>
           </a:p>
@@ -6748,15 +6720,7 @@
             <a:pPr lvl="1"/>
             <a:r>
               <a:rPr lang="ko-KR" altLang="en-US" smtClean="0"/>
-              <a:t>결제 </a:t>
-            </a:r>
-            <a:r>
-              <a:rPr lang="ko-KR" altLang="en-US" smtClean="0"/>
-              <a:t>확인 </a:t>
-            </a:r>
-            <a:r>
-              <a:rPr lang="ko-KR" altLang="en-US" smtClean="0"/>
-              <a:t>페이지로 </a:t>
+              <a:t>결제 확인 페이지로 </a:t>
             </a:r>
             <a:r>
               <a:rPr lang="ko-KR" altLang="en-US"/>
@@ -7332,11 +7296,7 @@
             <a:pPr lvl="1"/>
             <a:r>
               <a:rPr lang="ko-KR" altLang="en-US" smtClean="0"/>
-              <a:t>결제 </a:t>
-            </a:r>
-            <a:r>
-              <a:rPr lang="ko-KR" altLang="en-US" smtClean="0"/>
-              <a:t>확인 페이지로 이동하는 버튼</a:t>
+              <a:t>결제 확인 페이지로 이동하는 버튼</a:t>
             </a:r>
             <a:endParaRPr lang="en-US" altLang="ko-KR" dirty="0" smtClean="0"/>
           </a:p>
@@ -7723,11 +7683,7 @@
           <a:p>
             <a:r>
               <a:rPr lang="ko-KR" altLang="en-US" smtClean="0"/>
-              <a:t>결제 </a:t>
-            </a:r>
-            <a:r>
-              <a:rPr lang="ko-KR" altLang="en-US" smtClean="0"/>
-              <a:t>확인 </a:t>
+              <a:t>결제 확인 </a:t>
             </a:r>
             <a:r>
               <a:rPr lang="ko-KR" altLang="en-US" dirty="0" smtClean="0"/>
@@ -8182,11 +8138,7 @@
             </a:r>
             <a:r>
               <a:rPr lang="ko-KR" altLang="en-US" smtClean="0"/>
-              <a:t>이동하는 </a:t>
-            </a:r>
-            <a:r>
-              <a:rPr lang="ko-KR" altLang="en-US" smtClean="0"/>
-              <a:t>메뉴 링크</a:t>
+              <a:t>이동하는 메뉴 링크</a:t>
             </a:r>
             <a:endParaRPr lang="en-US" altLang="ko-KR" dirty="0" smtClean="0"/>
           </a:p>
@@ -10583,11 +10535,7 @@
             <a:pPr lvl="1"/>
             <a:r>
               <a:rPr lang="ko-KR" altLang="en-US" smtClean="0"/>
-              <a:t>비밀번호 </a:t>
-            </a:r>
-            <a:r>
-              <a:rPr lang="ko-KR" altLang="en-US" smtClean="0"/>
-              <a:t>확인</a:t>
+              <a:t>비밀번호 확인</a:t>
             </a:r>
             <a:endParaRPr lang="en-US" altLang="ko-KR" dirty="0" smtClean="0"/>
           </a:p>
@@ -10630,11 +10578,7 @@
             </a:r>
             <a:r>
               <a:rPr lang="ko-KR" altLang="en-US" smtClean="0"/>
-              <a:t>페이지로 </a:t>
-            </a:r>
-            <a:r>
-              <a:rPr lang="ko-KR" altLang="en-US" smtClean="0"/>
-              <a:t>이동하는 버튼</a:t>
+              <a:t>페이지로 이동하는 버튼</a:t>
             </a:r>
             <a:endParaRPr lang="ko-KR" altLang="en-US" dirty="0"/>
           </a:p>
@@ -10970,11 +10914,7 @@
             </a:r>
             <a:r>
               <a:rPr lang="ko-KR" altLang="en-US"/>
-              <a:t>대상 테이블의 종류를 </a:t>
-            </a:r>
-            <a:r>
-              <a:rPr lang="ko-KR" altLang="en-US"/>
-              <a:t>메뉴로 </a:t>
+              <a:t>대상 테이블의 종류를 메뉴로 </a:t>
             </a:r>
             <a:r>
               <a:rPr lang="ko-KR" altLang="en-US" smtClean="0"/>
@@ -11068,11 +11008,7 @@
             </a:r>
             <a:r>
               <a:rPr lang="ko-KR" altLang="en-US" smtClean="0"/>
-              <a:t>위한 </a:t>
-            </a:r>
-            <a:r>
-              <a:rPr lang="ko-KR" altLang="en-US" smtClean="0"/>
-              <a:t>체크박스</a:t>
+              <a:t>위한 체크박스</a:t>
             </a:r>
             <a:endParaRPr lang="en-US" altLang="ko-KR" smtClean="0"/>
           </a:p>
@@ -11088,11 +11024,7 @@
             <a:pPr lvl="1"/>
             <a:r>
               <a:rPr lang="ko-KR" altLang="en-US" smtClean="0"/>
-              <a:t>전체 </a:t>
-            </a:r>
-            <a:r>
-              <a:rPr lang="ko-KR" altLang="en-US" smtClean="0"/>
-              <a:t>삭제용 버튼</a:t>
+              <a:t>전체 삭제용 버튼</a:t>
             </a:r>
             <a:endParaRPr lang="en-US" altLang="ko-KR" smtClean="0"/>
           </a:p>
@@ -11134,11 +11066,7 @@
             <a:pPr lvl="1"/>
             <a:r>
               <a:rPr lang="ko-KR" altLang="en-US" smtClean="0"/>
-              <a:t>각 데이터의 상세 정보를 </a:t>
-            </a:r>
-            <a:r>
-              <a:rPr lang="ko-KR" altLang="en-US" smtClean="0"/>
-              <a:t>표시</a:t>
+              <a:t>각 데이터의 상세 정보를 표시</a:t>
             </a:r>
             <a:endParaRPr lang="en-US" altLang="ko-KR" smtClean="0"/>
           </a:p>
@@ -11914,11 +11842,7 @@
           <a:p>
             <a:r>
               <a:rPr lang="ko-KR" altLang="en-US" smtClean="0"/>
-              <a:t>테이블</a:t>
-            </a:r>
-            <a:r>
-              <a:rPr lang="ko-KR" altLang="en-US" smtClean="0"/>
-              <a:t>의 열</a:t>
+              <a:t>테이블의 열</a:t>
             </a:r>
             <a:endParaRPr lang="en-US" altLang="ko-KR" dirty="0" smtClean="0"/>
           </a:p>

</xml_diff>